<commit_message>
Version finale des slides
</commit_message>
<xml_diff>
--- a/protobuf-powered_wl.pptx
+++ b/protobuf-powered_wl.pptx
@@ -343,7 +343,7 @@
               <a:pPr>
                 <a:defRPr/>
               </a:pPr>
-              <a:t>26/04/2016</a:t>
+              <a:t>27/04/2016</a:t>
             </a:fld>
             <a:endParaRPr lang="nl-NL" sz="1200" dirty="0" smtClean="0">
               <a:ea typeface="Verdana" pitchFamily="34" charset="0"/>
@@ -1325,7 +1325,7 @@
               <a:pPr>
                 <a:defRPr/>
               </a:pPr>
-              <a:t>26/04/2016</a:t>
+              <a:t>27/04/2016</a:t>
             </a:fld>
             <a:endParaRPr lang="nl-NL" sz="1200" dirty="0" smtClean="0">
               <a:ea typeface="Verdana" pitchFamily="34" charset="0"/>
@@ -1753,7 +1753,7 @@
           <a:p>
             <a:fld id="{10B3F19B-9563-F042-816E-6C7946FA7A3B}" type="datetimeFigureOut">
               <a:rPr lang="fr-FR" smtClean="0"/>
-              <a:t>26/04/2016</a:t>
+              <a:t>27/04/2016</a:t>
             </a:fld>
             <a:endParaRPr lang="fr-FR"/>
           </a:p>
@@ -2170,7 +2170,7 @@
               <a:pPr>
                 <a:defRPr/>
               </a:pPr>
-              <a:t>26/04/2016</a:t>
+              <a:t>27/04/2016</a:t>
             </a:fld>
             <a:r>
               <a:rPr lang="en-US" sz="1000" dirty="0" smtClean="0">
@@ -4536,13 +4536,7 @@
               <a:rPr lang="fr-FR">
                 <a:hlinkClick r:id="rId4"/>
               </a:rPr>
-              <a:t>https://</a:t>
-            </a:r>
-            <a:r>
-              <a:rPr lang="fr-FR">
-                <a:hlinkClick r:id="rId4"/>
-              </a:rPr>
-              <a:t>bitbucket.org/thecopycat</a:t>
+              <a:t>https://bitbucket.org/thecopycat</a:t>
             </a:r>
             <a:r>
               <a:rPr lang="fr-FR" smtClean="0">

</xml_diff>